<commit_message>
Finished the README.MD file with all the requirements
</commit_message>
<xml_diff>
--- a/ppt/The Kols Grocery shopping application.pptx
+++ b/ppt/The Kols Grocery shopping application.pptx
@@ -116,6 +116,11 @@
       </a:defRPr>
     </a:lvl9pPr>
   </p:defaultTextStyle>
+  <p:extLst>
+    <p:ext uri="{EFAFB233-063F-42B5-8137-9DF3F51BA10A}">
+      <p15:sldGuideLst xmlns:p15="http://schemas.microsoft.com/office/powerpoint/2012/main"/>
+    </p:ext>
+  </p:extLst>
 </p:presentation>
 </file>
 
@@ -512,7 +517,7 @@
           <a:p>
             <a:fld id="{8F661A98-C38F-4EF9-AD08-722F3EEF0705}" type="datetimeFigureOut">
               <a:rPr lang="en-AU" smtClean="0"/>
-              <a:t>12/03/2020</a:t>
+              <a:t>13/03/2020</a:t>
             </a:fld>
             <a:endParaRPr lang="en-AU"/>
           </a:p>
@@ -712,7 +717,7 @@
           <a:p>
             <a:fld id="{8F661A98-C38F-4EF9-AD08-722F3EEF0705}" type="datetimeFigureOut">
               <a:rPr lang="en-AU" smtClean="0"/>
-              <a:t>12/03/2020</a:t>
+              <a:t>13/03/2020</a:t>
             </a:fld>
             <a:endParaRPr lang="en-AU"/>
           </a:p>
@@ -922,7 +927,7 @@
           <a:p>
             <a:fld id="{8F661A98-C38F-4EF9-AD08-722F3EEF0705}" type="datetimeFigureOut">
               <a:rPr lang="en-AU" smtClean="0"/>
-              <a:t>12/03/2020</a:t>
+              <a:t>13/03/2020</a:t>
             </a:fld>
             <a:endParaRPr lang="en-AU"/>
           </a:p>
@@ -1122,7 +1127,7 @@
           <a:p>
             <a:fld id="{8F661A98-C38F-4EF9-AD08-722F3EEF0705}" type="datetimeFigureOut">
               <a:rPr lang="en-AU" smtClean="0"/>
-              <a:t>12/03/2020</a:t>
+              <a:t>13/03/2020</a:t>
             </a:fld>
             <a:endParaRPr lang="en-AU"/>
           </a:p>
@@ -1398,7 +1403,7 @@
           <a:p>
             <a:fld id="{8F661A98-C38F-4EF9-AD08-722F3EEF0705}" type="datetimeFigureOut">
               <a:rPr lang="en-AU" smtClean="0"/>
-              <a:t>12/03/2020</a:t>
+              <a:t>13/03/2020</a:t>
             </a:fld>
             <a:endParaRPr lang="en-AU"/>
           </a:p>
@@ -1666,7 +1671,7 @@
           <a:p>
             <a:fld id="{8F661A98-C38F-4EF9-AD08-722F3EEF0705}" type="datetimeFigureOut">
               <a:rPr lang="en-AU" smtClean="0"/>
-              <a:t>12/03/2020</a:t>
+              <a:t>13/03/2020</a:t>
             </a:fld>
             <a:endParaRPr lang="en-AU"/>
           </a:p>
@@ -2081,7 +2086,7 @@
           <a:p>
             <a:fld id="{8F661A98-C38F-4EF9-AD08-722F3EEF0705}" type="datetimeFigureOut">
               <a:rPr lang="en-AU" smtClean="0"/>
-              <a:t>12/03/2020</a:t>
+              <a:t>13/03/2020</a:t>
             </a:fld>
             <a:endParaRPr lang="en-AU"/>
           </a:p>
@@ -2223,7 +2228,7 @@
           <a:p>
             <a:fld id="{8F661A98-C38F-4EF9-AD08-722F3EEF0705}" type="datetimeFigureOut">
               <a:rPr lang="en-AU" smtClean="0"/>
-              <a:t>12/03/2020</a:t>
+              <a:t>13/03/2020</a:t>
             </a:fld>
             <a:endParaRPr lang="en-AU"/>
           </a:p>
@@ -2336,7 +2341,7 @@
           <a:p>
             <a:fld id="{8F661A98-C38F-4EF9-AD08-722F3EEF0705}" type="datetimeFigureOut">
               <a:rPr lang="en-AU" smtClean="0"/>
-              <a:t>12/03/2020</a:t>
+              <a:t>13/03/2020</a:t>
             </a:fld>
             <a:endParaRPr lang="en-AU"/>
           </a:p>
@@ -2649,7 +2654,7 @@
           <a:p>
             <a:fld id="{8F661A98-C38F-4EF9-AD08-722F3EEF0705}" type="datetimeFigureOut">
               <a:rPr lang="en-AU" smtClean="0"/>
-              <a:t>12/03/2020</a:t>
+              <a:t>13/03/2020</a:t>
             </a:fld>
             <a:endParaRPr lang="en-AU"/>
           </a:p>
@@ -2938,7 +2943,7 @@
           <a:p>
             <a:fld id="{8F661A98-C38F-4EF9-AD08-722F3EEF0705}" type="datetimeFigureOut">
               <a:rPr lang="en-AU" smtClean="0"/>
-              <a:t>12/03/2020</a:t>
+              <a:t>13/03/2020</a:t>
             </a:fld>
             <a:endParaRPr lang="en-AU"/>
           </a:p>
@@ -3181,7 +3186,7 @@
           <a:p>
             <a:fld id="{8F661A98-C38F-4EF9-AD08-722F3EEF0705}" type="datetimeFigureOut">
               <a:rPr lang="en-AU" smtClean="0"/>
-              <a:t>12/03/2020</a:t>
+              <a:t>13/03/2020</a:t>
             </a:fld>
             <a:endParaRPr lang="en-AU"/>
           </a:p>
@@ -5090,7 +5095,7 @@
         </p:blipFill>
         <p:spPr>
           <a:xfrm>
-            <a:off x="385437" y="1310404"/>
+            <a:off x="385437" y="1328160"/>
             <a:ext cx="5083207" cy="5578357"/>
           </a:xfrm>
           <a:prstGeom prst="rect">

</xml_diff>